<commit_message>
revision for the client.py
</commit_message>
<xml_diff>
--- a/Figure_file_1.pptx
+++ b/Figure_file_1.pptx
@@ -5377,7 +5377,7 @@
         </p:nvSpPr>
         <p:spPr>
           <a:xfrm>
-            <a:off x="810467" y="104172"/>
+            <a:off x="810467" y="260430"/>
             <a:ext cx="10210366" cy="6597570"/>
           </a:xfrm>
           <a:prstGeom prst="rect">
@@ -5622,7 +5622,7 @@
                   <a:schemeClr val="tx1"/>
                 </a:solidFill>
               </a:rPr>
-              <a:t>수위 센서 작동</a:t>
+              <a:t>초음파 센서 작동</a:t>
             </a:r>
             <a:endParaRPr kumimoji="1" lang="ko-Kore-KR" altLang="en-US" sz="1400" b="1" dirty="0">
               <a:solidFill>
@@ -5650,7 +5650,7 @@
         <p:spPr>
           <a:xfrm flipH="1">
             <a:off x="6661507" y="2107056"/>
-            <a:ext cx="1213561" cy="0"/>
+            <a:ext cx="1066404" cy="0"/>
           </a:xfrm>
           <a:prstGeom prst="straightConnector1">
             <a:avLst/>
@@ -5685,13 +5685,14 @@
           </p:cNvPr>
           <p:cNvCxnSpPr>
             <a:cxnSpLocks/>
+            <a:stCxn id="13" idx="3"/>
           </p:cNvCxnSpPr>
           <p:nvPr/>
         </p:nvCxnSpPr>
         <p:spPr>
           <a:xfrm>
-            <a:off x="6728671" y="2987615"/>
-            <a:ext cx="1144989" cy="0"/>
+            <a:off x="7080724" y="3779171"/>
+            <a:ext cx="630128" cy="0"/>
           </a:xfrm>
           <a:prstGeom prst="straightConnector1">
             <a:avLst/>
@@ -5731,8 +5732,8 @@
         </p:nvCxnSpPr>
         <p:spPr>
           <a:xfrm flipV="1">
-            <a:off x="7873660" y="2107056"/>
-            <a:ext cx="1408" cy="880559"/>
+            <a:off x="7727911" y="2111235"/>
+            <a:ext cx="0" cy="1667936"/>
           </a:xfrm>
           <a:prstGeom prst="straightConnector1">
             <a:avLst/>
@@ -5810,14 +5811,14 @@
           </p:cNvPr>
           <p:cNvCxnSpPr>
             <a:cxnSpLocks/>
-            <a:stCxn id="5" idx="2"/>
+            <a:endCxn id="13" idx="0"/>
           </p:cNvCxnSpPr>
           <p:nvPr/>
         </p:nvCxnSpPr>
         <p:spPr>
           <a:xfrm>
-            <a:off x="5915650" y="2392943"/>
-            <a:ext cx="0" cy="215232"/>
+            <a:off x="5914792" y="3188294"/>
+            <a:ext cx="858" cy="212925"/>
           </a:xfrm>
           <a:prstGeom prst="straightConnector1">
             <a:avLst/>
@@ -5843,10 +5844,10 @@
       </p:cxnSp>
       <p:sp>
         <p:nvSpPr>
-          <p:cNvPr id="11" name="직사각형 10">
-            <a:extLst>
-              <a:ext uri="{FF2B5EF4-FFF2-40B4-BE49-F238E27FC236}">
-                <a16:creationId xmlns:a16="http://schemas.microsoft.com/office/drawing/2014/main" id="{5F37F8D8-B6CD-9DAB-2F05-5E42F0211F90}"/>
+          <p:cNvPr id="13" name="다이아몬드 12">
+            <a:extLst>
+              <a:ext uri="{FF2B5EF4-FFF2-40B4-BE49-F238E27FC236}">
+                <a16:creationId xmlns:a16="http://schemas.microsoft.com/office/drawing/2014/main" id="{09DD9F13-B1E2-CCC1-D687-5129712C52F2}"/>
               </a:ext>
             </a:extLst>
           </p:cNvPr>
@@ -5855,7 +5856,66 @@
         </p:nvSpPr>
         <p:spPr>
           <a:xfrm>
-            <a:off x="5173552" y="3579290"/>
+            <a:off x="4750575" y="3401219"/>
+            <a:ext cx="2330149" cy="755904"/>
+          </a:xfrm>
+          <a:prstGeom prst="diamond">
+            <a:avLst/>
+          </a:prstGeom>
+          <a:solidFill>
+            <a:schemeClr val="bg1"/>
+          </a:solidFill>
+          <a:ln w="38100">
+            <a:solidFill>
+              <a:schemeClr val="tx1"/>
+            </a:solidFill>
+          </a:ln>
+        </p:spPr>
+        <p:style>
+          <a:lnRef idx="2">
+            <a:schemeClr val="accent6"/>
+          </a:lnRef>
+          <a:fillRef idx="1">
+            <a:schemeClr val="lt1"/>
+          </a:fillRef>
+          <a:effectRef idx="0">
+            <a:schemeClr val="accent6"/>
+          </a:effectRef>
+          <a:fontRef idx="minor">
+            <a:schemeClr val="dk1"/>
+          </a:fontRef>
+        </p:style>
+        <p:txBody>
+          <a:bodyPr rtlCol="0" anchor="ctr"/>
+          <a:lstStyle/>
+          <a:p>
+            <a:pPr algn="ctr"/>
+            <a:r>
+              <a:rPr kumimoji="1" lang="ko-KR" altLang="en-US" sz="1400" b="1" dirty="0"/>
+              <a:t>오차 내의 값</a:t>
+            </a:r>
+            <a:r>
+              <a:rPr kumimoji="1" lang="en-US" altLang="ko-KR" sz="1400" b="1" dirty="0"/>
+              <a:t>?</a:t>
+            </a:r>
+          </a:p>
+        </p:txBody>
+      </p:sp>
+      <p:sp>
+        <p:nvSpPr>
+          <p:cNvPr id="14" name="직사각형 13">
+            <a:extLst>
+              <a:ext uri="{FF2B5EF4-FFF2-40B4-BE49-F238E27FC236}">
+                <a16:creationId xmlns:a16="http://schemas.microsoft.com/office/drawing/2014/main" id="{E7DFE6C0-56CD-1DC3-2E2F-0B43E644AD0E}"/>
+              </a:ext>
+            </a:extLst>
+          </p:cNvPr>
+          <p:cNvSpPr/>
+          <p:nvPr/>
+        </p:nvSpPr>
+        <p:spPr>
+          <a:xfrm>
+            <a:off x="5168935" y="4364634"/>
             <a:ext cx="1491714" cy="571774"/>
           </a:xfrm>
           <a:prstGeom prst="rect">
@@ -5897,15 +5957,7 @@
                   <a:schemeClr val="tx1"/>
                 </a:solidFill>
               </a:rPr>
-              <a:t>String</a:t>
-            </a:r>
-            <a:r>
-              <a:rPr kumimoji="1" lang="ko-KR" altLang="en-US" sz="1400" b="1" dirty="0" err="1">
-                <a:solidFill>
-                  <a:schemeClr val="tx1"/>
-                </a:solidFill>
-              </a:rPr>
-              <a:t>으로</a:t>
+              <a:t>RF </a:t>
             </a:r>
             <a:r>
               <a:rPr kumimoji="1" lang="ko-KR" altLang="en-US" sz="1400" b="1" dirty="0">
@@ -5913,7 +5965,23 @@
                   <a:schemeClr val="tx1"/>
                 </a:solidFill>
               </a:rPr>
-              <a:t> 변환</a:t>
+              <a:t>모듈로</a:t>
+            </a:r>
+            <a:endParaRPr kumimoji="1" lang="en-US" altLang="ko-KR" sz="1400" b="1" dirty="0">
+              <a:solidFill>
+                <a:schemeClr val="tx1"/>
+              </a:solidFill>
+            </a:endParaRPr>
+          </a:p>
+          <a:p>
+            <a:pPr algn="ctr"/>
+            <a:r>
+              <a:rPr kumimoji="1" lang="ko-KR" altLang="en-US" sz="1400" b="1" dirty="0">
+                <a:solidFill>
+                  <a:schemeClr val="tx1"/>
+                </a:solidFill>
+              </a:rPr>
+              <a:t>데이터 전송</a:t>
             </a:r>
             <a:endParaRPr kumimoji="1" lang="ko-Kore-KR" altLang="en-US" sz="1400" b="1" dirty="0">
               <a:solidFill>
@@ -5925,24 +5993,23 @@
       </p:sp>
       <p:cxnSp>
         <p:nvCxnSpPr>
-          <p:cNvPr id="12" name="직선 화살표 연결선 11">
-            <a:extLst>
-              <a:ext uri="{FF2B5EF4-FFF2-40B4-BE49-F238E27FC236}">
-                <a16:creationId xmlns:a16="http://schemas.microsoft.com/office/drawing/2014/main" id="{BAFFF08A-3311-3DC3-186C-F782636C48D9}"/>
+          <p:cNvPr id="15" name="직선 화살표 연결선 14">
+            <a:extLst>
+              <a:ext uri="{FF2B5EF4-FFF2-40B4-BE49-F238E27FC236}">
+                <a16:creationId xmlns:a16="http://schemas.microsoft.com/office/drawing/2014/main" id="{C8802BEA-8373-7A97-1060-6F669BCD3B8F}"/>
               </a:ext>
             </a:extLst>
           </p:cNvPr>
           <p:cNvCxnSpPr>
             <a:cxnSpLocks/>
-            <a:stCxn id="11" idx="0"/>
-            <a:endCxn id="13" idx="2"/>
+            <a:stCxn id="14" idx="0"/>
           </p:cNvCxnSpPr>
           <p:nvPr/>
         </p:nvCxnSpPr>
         <p:spPr>
           <a:xfrm flipV="1">
-            <a:off x="5919409" y="3361772"/>
-            <a:ext cx="0" cy="217518"/>
+            <a:off x="5914792" y="4153995"/>
+            <a:ext cx="0" cy="210639"/>
           </a:xfrm>
           <a:prstGeom prst="straightConnector1">
             <a:avLst/>
@@ -5969,10 +6036,10 @@
       </p:cxnSp>
       <p:sp>
         <p:nvSpPr>
-          <p:cNvPr id="13" name="다이아몬드 12">
-            <a:extLst>
-              <a:ext uri="{FF2B5EF4-FFF2-40B4-BE49-F238E27FC236}">
-                <a16:creationId xmlns:a16="http://schemas.microsoft.com/office/drawing/2014/main" id="{09DD9F13-B1E2-CCC1-D687-5129712C52F2}"/>
+          <p:cNvPr id="16" name="직사각형 15">
+            <a:extLst>
+              <a:ext uri="{FF2B5EF4-FFF2-40B4-BE49-F238E27FC236}">
+                <a16:creationId xmlns:a16="http://schemas.microsoft.com/office/drawing/2014/main" id="{BEBD45DA-85E3-5E98-B196-5856F4999DBD}"/>
               </a:ext>
             </a:extLst>
           </p:cNvPr>
@@ -5981,71 +6048,7 @@
         </p:nvSpPr>
         <p:spPr>
           <a:xfrm>
-            <a:off x="5110147" y="2605868"/>
-            <a:ext cx="1618524" cy="755904"/>
-          </a:xfrm>
-          <a:prstGeom prst="diamond">
-            <a:avLst/>
-          </a:prstGeom>
-          <a:solidFill>
-            <a:schemeClr val="bg1"/>
-          </a:solidFill>
-          <a:ln w="38100">
-            <a:solidFill>
-              <a:schemeClr val="tx1"/>
-            </a:solidFill>
-          </a:ln>
-        </p:spPr>
-        <p:style>
-          <a:lnRef idx="2">
-            <a:schemeClr val="accent6"/>
-          </a:lnRef>
-          <a:fillRef idx="1">
-            <a:schemeClr val="lt1"/>
-          </a:fillRef>
-          <a:effectRef idx="0">
-            <a:schemeClr val="accent6"/>
-          </a:effectRef>
-          <a:fontRef idx="minor">
-            <a:schemeClr val="dk1"/>
-          </a:fontRef>
-        </p:style>
-        <p:txBody>
-          <a:bodyPr rtlCol="0" anchor="ctr"/>
-          <a:lstStyle/>
-          <a:p>
-            <a:pPr algn="ctr"/>
-            <a:r>
-              <a:rPr kumimoji="1" lang="ko-Kore-KR" altLang="en-US" sz="1400" b="1" dirty="0"/>
-              <a:t>기준치</a:t>
-            </a:r>
-            <a:r>
-              <a:rPr kumimoji="1" lang="ko-KR" altLang="en-US" sz="1400" b="1" dirty="0"/>
-              <a:t> 도달</a:t>
-            </a:r>
-            <a:r>
-              <a:rPr kumimoji="1" lang="en-US" altLang="ko-KR" sz="1400" b="1" dirty="0"/>
-              <a:t>?</a:t>
-            </a:r>
-            <a:endParaRPr kumimoji="1" lang="ko-Kore-KR" altLang="en-US" sz="1400" b="1" dirty="0"/>
-          </a:p>
-        </p:txBody>
-      </p:sp>
-      <p:sp>
-        <p:nvSpPr>
-          <p:cNvPr id="14" name="직사각형 13">
-            <a:extLst>
-              <a:ext uri="{FF2B5EF4-FFF2-40B4-BE49-F238E27FC236}">
-                <a16:creationId xmlns:a16="http://schemas.microsoft.com/office/drawing/2014/main" id="{E7DFE6C0-56CD-1DC3-2E2F-0B43E644AD0E}"/>
-              </a:ext>
-            </a:extLst>
-          </p:cNvPr>
-          <p:cNvSpPr/>
-          <p:nvPr/>
-        </p:nvSpPr>
-        <p:spPr>
-          <a:xfrm>
-            <a:off x="5173552" y="4361703"/>
+            <a:off x="5168935" y="5157054"/>
             <a:ext cx="1491714" cy="571774"/>
           </a:xfrm>
           <a:prstGeom prst="rect">
@@ -6082,36 +6085,12 @@
           <a:p>
             <a:pPr algn="ctr"/>
             <a:r>
-              <a:rPr kumimoji="1" lang="en-US" altLang="ko-Kore-KR" sz="1400" b="1" dirty="0">
-                <a:solidFill>
-                  <a:schemeClr val="tx1"/>
-                </a:solidFill>
-              </a:rPr>
-              <a:t>RF </a:t>
-            </a:r>
-            <a:r>
               <a:rPr kumimoji="1" lang="ko-KR" altLang="en-US" sz="1400" b="1" dirty="0">
                 <a:solidFill>
                   <a:schemeClr val="tx1"/>
                 </a:solidFill>
               </a:rPr>
-              <a:t>모듈로</a:t>
-            </a:r>
-            <a:endParaRPr kumimoji="1" lang="en-US" altLang="ko-KR" sz="1400" b="1" dirty="0">
-              <a:solidFill>
-                <a:schemeClr val="tx1"/>
-              </a:solidFill>
-            </a:endParaRPr>
-          </a:p>
-          <a:p>
-            <a:pPr algn="ctr"/>
-            <a:r>
-              <a:rPr kumimoji="1" lang="ko-KR" altLang="en-US" sz="1400" b="1" dirty="0">
-                <a:solidFill>
-                  <a:schemeClr val="tx1"/>
-                </a:solidFill>
-              </a:rPr>
-              <a:t>데이터 전송</a:t>
+              <a:t>초기 높이 업데이트</a:t>
             </a:r>
             <a:endParaRPr kumimoji="1" lang="ko-Kore-KR" altLang="en-US" sz="1400" b="1" dirty="0">
               <a:solidFill>
@@ -6123,23 +6102,21 @@
       </p:sp>
       <p:cxnSp>
         <p:nvCxnSpPr>
-          <p:cNvPr id="15" name="직선 화살표 연결선 14">
-            <a:extLst>
-              <a:ext uri="{FF2B5EF4-FFF2-40B4-BE49-F238E27FC236}">
-                <a16:creationId xmlns:a16="http://schemas.microsoft.com/office/drawing/2014/main" id="{C8802BEA-8373-7A97-1060-6F669BCD3B8F}"/>
+          <p:cNvPr id="17" name="직선 화살표 연결선 16">
+            <a:extLst>
+              <a:ext uri="{FF2B5EF4-FFF2-40B4-BE49-F238E27FC236}">
+                <a16:creationId xmlns:a16="http://schemas.microsoft.com/office/drawing/2014/main" id="{8A4CDA76-BD47-B98A-2F03-5F778A9E00D8}"/>
               </a:ext>
             </a:extLst>
           </p:cNvPr>
           <p:cNvCxnSpPr>
             <a:cxnSpLocks/>
-            <a:stCxn id="14" idx="0"/>
-            <a:endCxn id="11" idx="2"/>
           </p:cNvCxnSpPr>
           <p:nvPr/>
         </p:nvCxnSpPr>
         <p:spPr>
           <a:xfrm flipV="1">
-            <a:off x="5919409" y="4151064"/>
+            <a:off x="5915739" y="4946415"/>
             <a:ext cx="0" cy="210639"/>
           </a:xfrm>
           <a:prstGeom prst="straightConnector1">
@@ -6167,10 +6144,10 @@
       </p:cxnSp>
       <p:sp>
         <p:nvSpPr>
-          <p:cNvPr id="16" name="직사각형 15">
-            <a:extLst>
-              <a:ext uri="{FF2B5EF4-FFF2-40B4-BE49-F238E27FC236}">
-                <a16:creationId xmlns:a16="http://schemas.microsoft.com/office/drawing/2014/main" id="{BEBD45DA-85E3-5E98-B196-5856F4999DBD}"/>
+          <p:cNvPr id="48" name="직사각형 47">
+            <a:extLst>
+              <a:ext uri="{FF2B5EF4-FFF2-40B4-BE49-F238E27FC236}">
+                <a16:creationId xmlns:a16="http://schemas.microsoft.com/office/drawing/2014/main" id="{DD3CFFE0-A156-3C9D-5C42-137102DAC244}"/>
               </a:ext>
             </a:extLst>
           </p:cNvPr>
@@ -6179,7 +6156,7 @@
         </p:nvSpPr>
         <p:spPr>
           <a:xfrm>
-            <a:off x="5169793" y="5144116"/>
+            <a:off x="5168935" y="2606513"/>
             <a:ext cx="1491714" cy="571774"/>
           </a:xfrm>
           <a:prstGeom prst="rect">
@@ -6221,7 +6198,7 @@
                   <a:schemeClr val="tx1"/>
                 </a:solidFill>
               </a:rPr>
-              <a:t>작동 중지</a:t>
+              <a:t>초기 높이와 비교</a:t>
             </a:r>
             <a:endParaRPr kumimoji="1" lang="ko-Kore-KR" altLang="en-US" sz="1400" b="1" dirty="0">
               <a:solidFill>
@@ -6233,10 +6210,10 @@
       </p:sp>
       <p:cxnSp>
         <p:nvCxnSpPr>
-          <p:cNvPr id="17" name="직선 화살표 연결선 16">
-            <a:extLst>
-              <a:ext uri="{FF2B5EF4-FFF2-40B4-BE49-F238E27FC236}">
-                <a16:creationId xmlns:a16="http://schemas.microsoft.com/office/drawing/2014/main" id="{8A4CDA76-BD47-B98A-2F03-5F778A9E00D8}"/>
+          <p:cNvPr id="49" name="직선 화살표 연결선 48">
+            <a:extLst>
+              <a:ext uri="{FF2B5EF4-FFF2-40B4-BE49-F238E27FC236}">
+                <a16:creationId xmlns:a16="http://schemas.microsoft.com/office/drawing/2014/main" id="{0C44FCB9-BA55-9094-8BB4-1EB316887CD2}"/>
               </a:ext>
             </a:extLst>
           </p:cNvPr>
@@ -6247,7 +6224,7 @@
         </p:nvCxnSpPr>
         <p:spPr>
           <a:xfrm flipV="1">
-            <a:off x="5916597" y="4933477"/>
+            <a:off x="5915739" y="2395874"/>
             <a:ext cx="0" cy="210639"/>
           </a:xfrm>
           <a:prstGeom prst="straightConnector1">

</xml_diff>